<commit_message>
Update Lista de Verificación del Proyecto 3.pptx
photo updates
</commit_message>
<xml_diff>
--- a/Computer Science Principles/Projects/translated/spanish/Project 3/Lista de Verificación del Proyecto 3.pptx
+++ b/Computer Science Principles/Projects/translated/spanish/Project 3/Lista de Verificación del Proyecto 3.pptx
@@ -125,6 +125,314 @@
     </p:ext>
   </p:extLst>
 </p:presentation>
+</file>
+
+<file path=ppt/changesInfos/changesInfo1.xml><?xml version="1.0" encoding="utf-8"?>
+<pc:chgInfo xmlns:a="http://schemas.openxmlformats.org/drawingml/2006/main" xmlns:r="http://schemas.openxmlformats.org/officeDocument/2006/relationships" xmlns:ac="http://schemas.microsoft.com/office/drawing/2013/main/command" xmlns:pc="http://schemas.microsoft.com/office/powerpoint/2013/main/command">
+  <pc:docChgLst>
+    <pc:chgData name="Joshua Gross" userId="7bb6a70e-9d37-46e4-96de-748557707bd0" providerId="ADAL" clId="{44631098-EF56-4354-95F0-43EF882E99E9}"/>
+    <pc:docChg chg="undo custSel modSld">
+      <pc:chgData name="Joshua Gross" userId="7bb6a70e-9d37-46e4-96de-748557707bd0" providerId="ADAL" clId="{44631098-EF56-4354-95F0-43EF882E99E9}" dt="2023-10-05T13:25:29.125" v="76" actId="1582"/>
+      <pc:docMkLst>
+        <pc:docMk/>
+      </pc:docMkLst>
+      <pc:sldChg chg="addSp delSp modSp">
+        <pc:chgData name="Joshua Gross" userId="7bb6a70e-9d37-46e4-96de-748557707bd0" providerId="ADAL" clId="{44631098-EF56-4354-95F0-43EF882E99E9}" dt="2023-10-05T13:19:48.514" v="21" actId="1076"/>
+        <pc:sldMkLst>
+          <pc:docMk/>
+          <pc:sldMk cId="1658153941" sldId="258"/>
+        </pc:sldMkLst>
+        <pc:picChg chg="add mod">
+          <ac:chgData name="Joshua Gross" userId="7bb6a70e-9d37-46e4-96de-748557707bd0" providerId="ADAL" clId="{44631098-EF56-4354-95F0-43EF882E99E9}" dt="2023-10-05T13:19:29.617" v="15" actId="1076"/>
+          <ac:picMkLst>
+            <pc:docMk/>
+            <pc:sldMk cId="1658153941" sldId="258"/>
+            <ac:picMk id="3" creationId="{021C0C0A-6DCB-4D5A-9C78-F39CA300DA1E}"/>
+          </ac:picMkLst>
+        </pc:picChg>
+        <pc:picChg chg="del">
+          <ac:chgData name="Joshua Gross" userId="7bb6a70e-9d37-46e4-96de-748557707bd0" providerId="ADAL" clId="{44631098-EF56-4354-95F0-43EF882E99E9}" dt="2023-10-05T13:19:41.611" v="16" actId="478"/>
+          <ac:picMkLst>
+            <pc:docMk/>
+            <pc:sldMk cId="1658153941" sldId="258"/>
+            <ac:picMk id="4" creationId="{E23F4A1F-72C7-4ADF-B7C1-B1F374F8A8BB}"/>
+          </ac:picMkLst>
+        </pc:picChg>
+        <pc:picChg chg="del">
+          <ac:chgData name="Joshua Gross" userId="7bb6a70e-9d37-46e4-96de-748557707bd0" providerId="ADAL" clId="{44631098-EF56-4354-95F0-43EF882E99E9}" dt="2023-10-05T13:19:21.938" v="10" actId="478"/>
+          <ac:picMkLst>
+            <pc:docMk/>
+            <pc:sldMk cId="1658153941" sldId="258"/>
+            <ac:picMk id="5" creationId="{DDF427E8-3ECF-477B-83AE-D4E4F5BDCAE4}"/>
+          </ac:picMkLst>
+        </pc:picChg>
+        <pc:picChg chg="add mod">
+          <ac:chgData name="Joshua Gross" userId="7bb6a70e-9d37-46e4-96de-748557707bd0" providerId="ADAL" clId="{44631098-EF56-4354-95F0-43EF882E99E9}" dt="2023-10-05T13:19:48.514" v="21" actId="1076"/>
+          <ac:picMkLst>
+            <pc:docMk/>
+            <pc:sldMk cId="1658153941" sldId="258"/>
+            <ac:picMk id="10" creationId="{AB707DF6-A4ED-4831-B30F-68AA2EE2A5D2}"/>
+          </ac:picMkLst>
+        </pc:picChg>
+      </pc:sldChg>
+      <pc:sldChg chg="addSp delSp modSp">
+        <pc:chgData name="Joshua Gross" userId="7bb6a70e-9d37-46e4-96de-748557707bd0" providerId="ADAL" clId="{44631098-EF56-4354-95F0-43EF882E99E9}" dt="2023-10-05T13:24:13.348" v="61" actId="1076"/>
+        <pc:sldMkLst>
+          <pc:docMk/>
+          <pc:sldMk cId="1152250863" sldId="260"/>
+        </pc:sldMkLst>
+        <pc:picChg chg="del">
+          <ac:chgData name="Joshua Gross" userId="7bb6a70e-9d37-46e4-96de-748557707bd0" providerId="ADAL" clId="{44631098-EF56-4354-95F0-43EF882E99E9}" dt="2023-10-05T13:24:02.613" v="57" actId="478"/>
+          <ac:picMkLst>
+            <pc:docMk/>
+            <pc:sldMk cId="1152250863" sldId="260"/>
+            <ac:picMk id="4" creationId="{E23F4A1F-72C7-4ADF-B7C1-B1F374F8A8BB}"/>
+          </ac:picMkLst>
+        </pc:picChg>
+        <pc:picChg chg="add mod modCrop">
+          <ac:chgData name="Joshua Gross" userId="7bb6a70e-9d37-46e4-96de-748557707bd0" providerId="ADAL" clId="{44631098-EF56-4354-95F0-43EF882E99E9}" dt="2023-10-05T13:24:13.348" v="61" actId="1076"/>
+          <ac:picMkLst>
+            <pc:docMk/>
+            <pc:sldMk cId="1152250863" sldId="260"/>
+            <ac:picMk id="6" creationId="{AAF902E2-0B5A-4BB2-BB82-4095167A7865}"/>
+          </ac:picMkLst>
+        </pc:picChg>
+      </pc:sldChg>
+      <pc:sldChg chg="addSp delSp modSp">
+        <pc:chgData name="Joshua Gross" userId="7bb6a70e-9d37-46e4-96de-748557707bd0" providerId="ADAL" clId="{44631098-EF56-4354-95F0-43EF882E99E9}" dt="2023-10-05T13:18:55.857" v="9" actId="1076"/>
+        <pc:sldMkLst>
+          <pc:docMk/>
+          <pc:sldMk cId="2353882107" sldId="261"/>
+        </pc:sldMkLst>
+        <pc:picChg chg="del">
+          <ac:chgData name="Joshua Gross" userId="7bb6a70e-9d37-46e4-96de-748557707bd0" providerId="ADAL" clId="{44631098-EF56-4354-95F0-43EF882E99E9}" dt="2023-10-05T13:18:28.397" v="0" actId="478"/>
+          <ac:picMkLst>
+            <pc:docMk/>
+            <pc:sldMk cId="2353882107" sldId="261"/>
+            <ac:picMk id="4" creationId="{E23F4A1F-72C7-4ADF-B7C1-B1F374F8A8BB}"/>
+          </ac:picMkLst>
+        </pc:picChg>
+        <pc:picChg chg="del">
+          <ac:chgData name="Joshua Gross" userId="7bb6a70e-9d37-46e4-96de-748557707bd0" providerId="ADAL" clId="{44631098-EF56-4354-95F0-43EF882E99E9}" dt="2023-10-05T13:18:47.937" v="4" actId="478"/>
+          <ac:picMkLst>
+            <pc:docMk/>
+            <pc:sldMk cId="2353882107" sldId="261"/>
+            <ac:picMk id="5" creationId="{9A434D42-966C-479D-84D7-12AD38ACDE9D}"/>
+          </ac:picMkLst>
+        </pc:picChg>
+        <pc:picChg chg="add mod">
+          <ac:chgData name="Joshua Gross" userId="7bb6a70e-9d37-46e4-96de-748557707bd0" providerId="ADAL" clId="{44631098-EF56-4354-95F0-43EF882E99E9}" dt="2023-10-05T13:18:34.562" v="3" actId="1076"/>
+          <ac:picMkLst>
+            <pc:docMk/>
+            <pc:sldMk cId="2353882107" sldId="261"/>
+            <ac:picMk id="6" creationId="{9556F4E3-B92F-4319-983B-1E6EF6E634A7}"/>
+          </ac:picMkLst>
+        </pc:picChg>
+        <pc:picChg chg="add mod">
+          <ac:chgData name="Joshua Gross" userId="7bb6a70e-9d37-46e4-96de-748557707bd0" providerId="ADAL" clId="{44631098-EF56-4354-95F0-43EF882E99E9}" dt="2023-10-05T13:18:55.857" v="9" actId="1076"/>
+          <ac:picMkLst>
+            <pc:docMk/>
+            <pc:sldMk cId="2353882107" sldId="261"/>
+            <ac:picMk id="7" creationId="{519158DF-FB22-4A70-833B-94A4B3FBBAA6}"/>
+          </ac:picMkLst>
+        </pc:picChg>
+      </pc:sldChg>
+      <pc:sldChg chg="addSp delSp modSp">
+        <pc:chgData name="Joshua Gross" userId="7bb6a70e-9d37-46e4-96de-748557707bd0" providerId="ADAL" clId="{44631098-EF56-4354-95F0-43EF882E99E9}" dt="2023-10-05T13:22:46.939" v="48" actId="14100"/>
+        <pc:sldMkLst>
+          <pc:docMk/>
+          <pc:sldMk cId="1597390541" sldId="262"/>
+        </pc:sldMkLst>
+        <pc:picChg chg="add del mod">
+          <ac:chgData name="Joshua Gross" userId="7bb6a70e-9d37-46e4-96de-748557707bd0" providerId="ADAL" clId="{44631098-EF56-4354-95F0-43EF882E99E9}" dt="2023-10-05T13:22:01.045" v="38"/>
+          <ac:picMkLst>
+            <pc:docMk/>
+            <pc:sldMk cId="1597390541" sldId="262"/>
+            <ac:picMk id="3" creationId="{7EB562C6-CA39-4953-8916-07BDF85232E1}"/>
+          </ac:picMkLst>
+        </pc:picChg>
+        <pc:picChg chg="add mod">
+          <ac:chgData name="Joshua Gross" userId="7bb6a70e-9d37-46e4-96de-748557707bd0" providerId="ADAL" clId="{44631098-EF56-4354-95F0-43EF882E99E9}" dt="2023-10-05T13:22:23.283" v="43" actId="1076"/>
+          <ac:picMkLst>
+            <pc:docMk/>
+            <pc:sldMk cId="1597390541" sldId="262"/>
+            <ac:picMk id="4" creationId="{CBD718E5-61F9-402C-B616-F64496F20B82}"/>
+          </ac:picMkLst>
+        </pc:picChg>
+        <pc:picChg chg="add del">
+          <ac:chgData name="Joshua Gross" userId="7bb6a70e-9d37-46e4-96de-748557707bd0" providerId="ADAL" clId="{44631098-EF56-4354-95F0-43EF882E99E9}" dt="2023-10-05T13:21:41.763" v="32" actId="478"/>
+          <ac:picMkLst>
+            <pc:docMk/>
+            <pc:sldMk cId="1597390541" sldId="262"/>
+            <ac:picMk id="5" creationId="{0BE2251C-899B-4125-BA01-392020058228}"/>
+          </ac:picMkLst>
+        </pc:picChg>
+        <pc:picChg chg="del">
+          <ac:chgData name="Joshua Gross" userId="7bb6a70e-9d37-46e4-96de-748557707bd0" providerId="ADAL" clId="{44631098-EF56-4354-95F0-43EF882E99E9}" dt="2023-10-05T13:22:38.308" v="44" actId="478"/>
+          <ac:picMkLst>
+            <pc:docMk/>
+            <pc:sldMk cId="1597390541" sldId="262"/>
+            <ac:picMk id="6" creationId="{49B34222-9073-4EFC-93E1-490D8AE958A1}"/>
+          </ac:picMkLst>
+        </pc:picChg>
+        <pc:picChg chg="add del">
+          <ac:chgData name="Joshua Gross" userId="7bb6a70e-9d37-46e4-96de-748557707bd0" providerId="ADAL" clId="{44631098-EF56-4354-95F0-43EF882E99E9}" dt="2023-10-05T13:21:40.132" v="30"/>
+          <ac:picMkLst>
+            <pc:docMk/>
+            <pc:sldMk cId="1597390541" sldId="262"/>
+            <ac:picMk id="7" creationId="{DF10BDE8-0EF1-4154-B216-0254D01333CE}"/>
+          </ac:picMkLst>
+        </pc:picChg>
+        <pc:picChg chg="add mod">
+          <ac:chgData name="Joshua Gross" userId="7bb6a70e-9d37-46e4-96de-748557707bd0" providerId="ADAL" clId="{44631098-EF56-4354-95F0-43EF882E99E9}" dt="2023-10-05T13:22:46.939" v="48" actId="14100"/>
+          <ac:picMkLst>
+            <pc:docMk/>
+            <pc:sldMk cId="1597390541" sldId="262"/>
+            <ac:picMk id="8" creationId="{5F4746B6-BAFA-437B-BFFE-199CFB4CE1FB}"/>
+          </ac:picMkLst>
+        </pc:picChg>
+      </pc:sldChg>
+      <pc:sldChg chg="addSp delSp modSp">
+        <pc:chgData name="Joshua Gross" userId="7bb6a70e-9d37-46e4-96de-748557707bd0" providerId="ADAL" clId="{44631098-EF56-4354-95F0-43EF882E99E9}" dt="2023-10-05T13:24:48.893" v="68" actId="1076"/>
+        <pc:sldMkLst>
+          <pc:docMk/>
+          <pc:sldMk cId="357024841" sldId="263"/>
+        </pc:sldMkLst>
+        <pc:picChg chg="add mod">
+          <ac:chgData name="Joshua Gross" userId="7bb6a70e-9d37-46e4-96de-748557707bd0" providerId="ADAL" clId="{44631098-EF56-4354-95F0-43EF882E99E9}" dt="2023-10-05T13:24:48.893" v="68" actId="1076"/>
+          <ac:picMkLst>
+            <pc:docMk/>
+            <pc:sldMk cId="357024841" sldId="263"/>
+            <ac:picMk id="4" creationId="{30BAAAB4-2860-4C88-9276-3517DF6E207D}"/>
+          </ac:picMkLst>
+        </pc:picChg>
+        <pc:picChg chg="del">
+          <ac:chgData name="Joshua Gross" userId="7bb6a70e-9d37-46e4-96de-748557707bd0" providerId="ADAL" clId="{44631098-EF56-4354-95F0-43EF882E99E9}" dt="2023-10-05T13:24:46.508" v="66" actId="478"/>
+          <ac:picMkLst>
+            <pc:docMk/>
+            <pc:sldMk cId="357024841" sldId="263"/>
+            <ac:picMk id="5" creationId="{4AA45268-2785-45E6-A39F-206F504538E9}"/>
+          </ac:picMkLst>
+        </pc:picChg>
+      </pc:sldChg>
+      <pc:sldChg chg="addSp delSp modSp">
+        <pc:chgData name="Joshua Gross" userId="7bb6a70e-9d37-46e4-96de-748557707bd0" providerId="ADAL" clId="{44631098-EF56-4354-95F0-43EF882E99E9}" dt="2023-10-05T13:20:16.930" v="27" actId="1076"/>
+        <pc:sldMkLst>
+          <pc:docMk/>
+          <pc:sldMk cId="1399610798" sldId="265"/>
+        </pc:sldMkLst>
+        <pc:picChg chg="del">
+          <ac:chgData name="Joshua Gross" userId="7bb6a70e-9d37-46e4-96de-748557707bd0" providerId="ADAL" clId="{44631098-EF56-4354-95F0-43EF882E99E9}" dt="2023-10-05T13:20:09.027" v="22" actId="478"/>
+          <ac:picMkLst>
+            <pc:docMk/>
+            <pc:sldMk cId="1399610798" sldId="265"/>
+            <ac:picMk id="3" creationId="{E8A2492A-95D1-4B74-A4CC-FE5F0BA46E04}"/>
+          </ac:picMkLst>
+        </pc:picChg>
+        <pc:picChg chg="add mod">
+          <ac:chgData name="Joshua Gross" userId="7bb6a70e-9d37-46e4-96de-748557707bd0" providerId="ADAL" clId="{44631098-EF56-4354-95F0-43EF882E99E9}" dt="2023-10-05T13:20:16.930" v="27" actId="1076"/>
+          <ac:picMkLst>
+            <pc:docMk/>
+            <pc:sldMk cId="1399610798" sldId="265"/>
+            <ac:picMk id="4" creationId="{08BB0FE9-954B-45F4-B291-AAACB8131A3C}"/>
+          </ac:picMkLst>
+        </pc:picChg>
+      </pc:sldChg>
+      <pc:sldChg chg="addSp delSp modSp">
+        <pc:chgData name="Joshua Gross" userId="7bb6a70e-9d37-46e4-96de-748557707bd0" providerId="ADAL" clId="{44631098-EF56-4354-95F0-43EF882E99E9}" dt="2023-10-05T13:24:24.629" v="65" actId="732"/>
+        <pc:sldMkLst>
+          <pc:docMk/>
+          <pc:sldMk cId="4197318355" sldId="267"/>
+        </pc:sldMkLst>
+        <pc:picChg chg="del">
+          <ac:chgData name="Joshua Gross" userId="7bb6a70e-9d37-46e4-96de-748557707bd0" providerId="ADAL" clId="{44631098-EF56-4354-95F0-43EF882E99E9}" dt="2023-10-05T13:24:18.740" v="62" actId="478"/>
+          <ac:picMkLst>
+            <pc:docMk/>
+            <pc:sldMk cId="4197318355" sldId="267"/>
+            <ac:picMk id="4" creationId="{E23F4A1F-72C7-4ADF-B7C1-B1F374F8A8BB}"/>
+          </ac:picMkLst>
+        </pc:picChg>
+        <pc:picChg chg="add mod modCrop">
+          <ac:chgData name="Joshua Gross" userId="7bb6a70e-9d37-46e4-96de-748557707bd0" providerId="ADAL" clId="{44631098-EF56-4354-95F0-43EF882E99E9}" dt="2023-10-05T13:24:24.629" v="65" actId="732"/>
+          <ac:picMkLst>
+            <pc:docMk/>
+            <pc:sldMk cId="4197318355" sldId="267"/>
+            <ac:picMk id="8" creationId="{5A8337DE-D966-4390-9BBF-ABC5944C175D}"/>
+          </ac:picMkLst>
+        </pc:picChg>
+      </pc:sldChg>
+      <pc:sldChg chg="addSp delSp modSp">
+        <pc:chgData name="Joshua Gross" userId="7bb6a70e-9d37-46e4-96de-748557707bd0" providerId="ADAL" clId="{44631098-EF56-4354-95F0-43EF882E99E9}" dt="2023-10-05T13:23:15.764" v="52" actId="1076"/>
+        <pc:sldMkLst>
+          <pc:docMk/>
+          <pc:sldMk cId="263100609" sldId="268"/>
+        </pc:sldMkLst>
+        <pc:picChg chg="del">
+          <ac:chgData name="Joshua Gross" userId="7bb6a70e-9d37-46e4-96de-748557707bd0" providerId="ADAL" clId="{44631098-EF56-4354-95F0-43EF882E99E9}" dt="2023-10-05T13:23:03.612" v="49" actId="478"/>
+          <ac:picMkLst>
+            <pc:docMk/>
+            <pc:sldMk cId="263100609" sldId="268"/>
+            <ac:picMk id="5" creationId="{0BE2251C-899B-4125-BA01-392020058228}"/>
+          </ac:picMkLst>
+        </pc:picChg>
+        <pc:picChg chg="add mod modCrop">
+          <ac:chgData name="Joshua Gross" userId="7bb6a70e-9d37-46e4-96de-748557707bd0" providerId="ADAL" clId="{44631098-EF56-4354-95F0-43EF882E99E9}" dt="2023-10-05T13:23:15.764" v="52" actId="1076"/>
+          <ac:picMkLst>
+            <pc:docMk/>
+            <pc:sldMk cId="263100609" sldId="268"/>
+            <ac:picMk id="7" creationId="{0DCF20A7-1706-4966-83E0-D94EE445708B}"/>
+          </ac:picMkLst>
+        </pc:picChg>
+      </pc:sldChg>
+      <pc:sldChg chg="addSp delSp modSp">
+        <pc:chgData name="Joshua Gross" userId="7bb6a70e-9d37-46e4-96de-748557707bd0" providerId="ADAL" clId="{44631098-EF56-4354-95F0-43EF882E99E9}" dt="2023-10-05T13:23:55.684" v="56" actId="732"/>
+        <pc:sldMkLst>
+          <pc:docMk/>
+          <pc:sldMk cId="1922963660" sldId="269"/>
+        </pc:sldMkLst>
+        <pc:picChg chg="add mod modCrop">
+          <ac:chgData name="Joshua Gross" userId="7bb6a70e-9d37-46e4-96de-748557707bd0" providerId="ADAL" clId="{44631098-EF56-4354-95F0-43EF882E99E9}" dt="2023-10-05T13:23:55.684" v="56" actId="732"/>
+          <ac:picMkLst>
+            <pc:docMk/>
+            <pc:sldMk cId="1922963660" sldId="269"/>
+            <ac:picMk id="5" creationId="{9150C137-41C1-489F-B8AD-35BD98BBF80F}"/>
+          </ac:picMkLst>
+        </pc:picChg>
+        <pc:picChg chg="del">
+          <ac:chgData name="Joshua Gross" userId="7bb6a70e-9d37-46e4-96de-748557707bd0" providerId="ADAL" clId="{44631098-EF56-4354-95F0-43EF882E99E9}" dt="2023-10-05T13:23:18.820" v="53" actId="478"/>
+          <ac:picMkLst>
+            <pc:docMk/>
+            <pc:sldMk cId="1922963660" sldId="269"/>
+            <ac:picMk id="6" creationId="{5CCE1306-047B-4405-8DA7-3DD29A208E36}"/>
+          </ac:picMkLst>
+        </pc:picChg>
+      </pc:sldChg>
+      <pc:sldChg chg="addSp delSp modSp">
+        <pc:chgData name="Joshua Gross" userId="7bb6a70e-9d37-46e4-96de-748557707bd0" providerId="ADAL" clId="{44631098-EF56-4354-95F0-43EF882E99E9}" dt="2023-10-05T13:25:29.125" v="76" actId="1582"/>
+        <pc:sldMkLst>
+          <pc:docMk/>
+          <pc:sldMk cId="3404208113" sldId="270"/>
+        </pc:sldMkLst>
+        <pc:picChg chg="add mod">
+          <ac:chgData name="Joshua Gross" userId="7bb6a70e-9d37-46e4-96de-748557707bd0" providerId="ADAL" clId="{44631098-EF56-4354-95F0-43EF882E99E9}" dt="2023-10-05T13:25:29.125" v="76" actId="1582"/>
+          <ac:picMkLst>
+            <pc:docMk/>
+            <pc:sldMk cId="3404208113" sldId="270"/>
+            <ac:picMk id="3" creationId="{034174D1-CD64-48FE-9862-C1BEE832917A}"/>
+          </ac:picMkLst>
+        </pc:picChg>
+        <pc:picChg chg="del">
+          <ac:chgData name="Joshua Gross" userId="7bb6a70e-9d37-46e4-96de-748557707bd0" providerId="ADAL" clId="{44631098-EF56-4354-95F0-43EF882E99E9}" dt="2023-10-05T13:25:06.540" v="69" actId="478"/>
+          <ac:picMkLst>
+            <pc:docMk/>
+            <pc:sldMk cId="3404208113" sldId="270"/>
+            <ac:picMk id="5" creationId="{4AA45268-2785-45E6-A39F-206F504538E9}"/>
+          </ac:picMkLst>
+        </pc:picChg>
+      </pc:sldChg>
+    </pc:docChg>
+  </pc:docChgLst>
+</pc:chgInfo>
 </file>
 
 <file path=ppt/slideLayouts/slideLayout1.xml><?xml version="1.0" encoding="utf-8"?>
@@ -3454,35 +3762,6 @@
           </a:p>
         </p:txBody>
       </p:sp>
-      <p:pic>
-        <p:nvPicPr>
-          <p:cNvPr id="5" name="Picture 4">
-            <a:extLst>
-              <a:ext uri="{FF2B5EF4-FFF2-40B4-BE49-F238E27FC236}">
-                <a16:creationId xmlns:a16="http://schemas.microsoft.com/office/drawing/2014/main" id="{0BE2251C-899B-4125-BA01-392020058228}"/>
-              </a:ext>
-            </a:extLst>
-          </p:cNvPr>
-          <p:cNvPicPr>
-            <a:picLocks noChangeAspect="1"/>
-          </p:cNvPicPr>
-          <p:nvPr/>
-        </p:nvPicPr>
-        <p:blipFill rotWithShape="1">
-          <a:blip r:embed="rId2"/>
-          <a:srcRect t="25976"/>
-          <a:stretch/>
-        </p:blipFill>
-        <p:spPr>
-          <a:xfrm>
-            <a:off x="719443" y="2021746"/>
-            <a:ext cx="10391164" cy="1823151"/>
-          </a:xfrm>
-          <a:prstGeom prst="rect">
-            <a:avLst/>
-          </a:prstGeom>
-        </p:spPr>
-      </p:pic>
       <p:sp>
         <p:nvSpPr>
           <p:cNvPr id="6" name="TextBox 5">
@@ -3643,6 +3922,35 @@
           </a:p>
         </p:txBody>
       </p:sp>
+      <p:pic>
+        <p:nvPicPr>
+          <p:cNvPr id="7" name="Picture 6">
+            <a:extLst>
+              <a:ext uri="{FF2B5EF4-FFF2-40B4-BE49-F238E27FC236}">
+                <a16:creationId xmlns:a16="http://schemas.microsoft.com/office/drawing/2014/main" id="{0DCF20A7-1706-4966-83E0-D94EE445708B}"/>
+              </a:ext>
+            </a:extLst>
+          </p:cNvPr>
+          <p:cNvPicPr>
+            <a:picLocks noChangeAspect="1"/>
+          </p:cNvPicPr>
+          <p:nvPr/>
+        </p:nvPicPr>
+        <p:blipFill rotWithShape="1">
+          <a:blip r:embed="rId2"/>
+          <a:srcRect t="28514"/>
+          <a:stretch/>
+        </p:blipFill>
+        <p:spPr>
+          <a:xfrm>
+            <a:off x="1722540" y="1955186"/>
+            <a:ext cx="7291605" cy="1816971"/>
+          </a:xfrm>
+          <a:prstGeom prst="rect">
+            <a:avLst/>
+          </a:prstGeom>
+        </p:spPr>
+      </p:pic>
     </p:spTree>
     <p:extLst>
       <p:ext uri="{BB962C8B-B14F-4D97-AF65-F5344CB8AC3E}">
@@ -3875,10 +4183,10 @@
       </p:sp>
       <p:pic>
         <p:nvPicPr>
-          <p:cNvPr id="6" name="Picture 5">
-            <a:extLst>
-              <a:ext uri="{FF2B5EF4-FFF2-40B4-BE49-F238E27FC236}">
-                <a16:creationId xmlns:a16="http://schemas.microsoft.com/office/drawing/2014/main" id="{5CCE1306-047B-4405-8DA7-3DD29A208E36}"/>
+          <p:cNvPr id="5" name="Picture 4">
+            <a:extLst>
+              <a:ext uri="{FF2B5EF4-FFF2-40B4-BE49-F238E27FC236}">
+                <a16:creationId xmlns:a16="http://schemas.microsoft.com/office/drawing/2014/main" id="{9150C137-41C1-489F-B8AD-35BD98BBF80F}"/>
               </a:ext>
             </a:extLst>
           </p:cNvPr>
@@ -3889,13 +4197,13 @@
         </p:nvPicPr>
         <p:blipFill rotWithShape="1">
           <a:blip r:embed="rId2"/>
-          <a:srcRect t="24395"/>
+          <a:srcRect t="26431"/>
           <a:stretch/>
         </p:blipFill>
         <p:spPr>
           <a:xfrm>
-            <a:off x="900418" y="1979802"/>
-            <a:ext cx="10391164" cy="1952736"/>
+            <a:off x="2200712" y="1946245"/>
+            <a:ext cx="7291605" cy="1888557"/>
           </a:xfrm>
           <a:prstGeom prst="rect">
             <a:avLst/>
@@ -3961,35 +4269,6 @@
           </a:p>
         </p:txBody>
       </p:sp>
-      <p:pic>
-        <p:nvPicPr>
-          <p:cNvPr id="4" name="Picture 3">
-            <a:extLst>
-              <a:ext uri="{FF2B5EF4-FFF2-40B4-BE49-F238E27FC236}">
-                <a16:creationId xmlns:a16="http://schemas.microsoft.com/office/drawing/2014/main" id="{E23F4A1F-72C7-4ADF-B7C1-B1F374F8A8BB}"/>
-              </a:ext>
-            </a:extLst>
-          </p:cNvPr>
-          <p:cNvPicPr>
-            <a:picLocks noChangeAspect="1"/>
-          </p:cNvPicPr>
-          <p:nvPr/>
-        </p:nvPicPr>
-        <p:blipFill rotWithShape="1">
-          <a:blip r:embed="rId2"/>
-          <a:srcRect b="85317"/>
-          <a:stretch/>
-        </p:blipFill>
-        <p:spPr>
-          <a:xfrm>
-            <a:off x="741028" y="1690688"/>
-            <a:ext cx="10709944" cy="725341"/>
-          </a:xfrm>
-          <a:prstGeom prst="rect">
-            <a:avLst/>
-          </a:prstGeom>
-        </p:spPr>
-      </p:pic>
       <p:sp>
         <p:nvSpPr>
           <p:cNvPr id="5" name="TextBox 4">
@@ -4026,6 +4305,35 @@
           </a:p>
         </p:txBody>
       </p:sp>
+      <p:pic>
+        <p:nvPicPr>
+          <p:cNvPr id="6" name="Picture 5">
+            <a:extLst>
+              <a:ext uri="{FF2B5EF4-FFF2-40B4-BE49-F238E27FC236}">
+                <a16:creationId xmlns:a16="http://schemas.microsoft.com/office/drawing/2014/main" id="{AAF902E2-0B5A-4BB2-BB82-4095167A7865}"/>
+              </a:ext>
+            </a:extLst>
+          </p:cNvPr>
+          <p:cNvPicPr>
+            <a:picLocks noChangeAspect="1"/>
+          </p:cNvPicPr>
+          <p:nvPr/>
+        </p:nvPicPr>
+        <p:blipFill rotWithShape="1">
+          <a:blip r:embed="rId2"/>
+          <a:srcRect b="75530"/>
+          <a:stretch/>
+        </p:blipFill>
+        <p:spPr>
+          <a:xfrm>
+            <a:off x="900418" y="1762693"/>
+            <a:ext cx="7291605" cy="628169"/>
+          </a:xfrm>
+          <a:prstGeom prst="rect">
+            <a:avLst/>
+          </a:prstGeom>
+        </p:spPr>
+      </p:pic>
     </p:spTree>
     <p:extLst>
       <p:ext uri="{BB962C8B-B14F-4D97-AF65-F5344CB8AC3E}">
@@ -4090,35 +4398,6 @@
           </a:p>
         </p:txBody>
       </p:sp>
-      <p:pic>
-        <p:nvPicPr>
-          <p:cNvPr id="4" name="Picture 3">
-            <a:extLst>
-              <a:ext uri="{FF2B5EF4-FFF2-40B4-BE49-F238E27FC236}">
-                <a16:creationId xmlns:a16="http://schemas.microsoft.com/office/drawing/2014/main" id="{E23F4A1F-72C7-4ADF-B7C1-B1F374F8A8BB}"/>
-              </a:ext>
-            </a:extLst>
-          </p:cNvPr>
-          <p:cNvPicPr>
-            <a:picLocks noChangeAspect="1"/>
-          </p:cNvPicPr>
-          <p:nvPr/>
-        </p:nvPicPr>
-        <p:blipFill rotWithShape="1">
-          <a:blip r:embed="rId2"/>
-          <a:srcRect r="47955" b="85317"/>
-          <a:stretch/>
-        </p:blipFill>
-        <p:spPr>
-          <a:xfrm>
-            <a:off x="131428" y="1042267"/>
-            <a:ext cx="5574047" cy="725341"/>
-          </a:xfrm>
-          <a:prstGeom prst="rect">
-            <a:avLst/>
-          </a:prstGeom>
-        </p:spPr>
-      </p:pic>
       <p:sp>
         <p:nvSpPr>
           <p:cNvPr id="6" name="TextBox 5">
@@ -4585,6 +4864,35 @@
           </a:p>
         </p:txBody>
       </p:sp>
+      <p:pic>
+        <p:nvPicPr>
+          <p:cNvPr id="8" name="Picture 7">
+            <a:extLst>
+              <a:ext uri="{FF2B5EF4-FFF2-40B4-BE49-F238E27FC236}">
+                <a16:creationId xmlns:a16="http://schemas.microsoft.com/office/drawing/2014/main" id="{5A8337DE-D966-4390-9BBF-ABC5944C175D}"/>
+              </a:ext>
+            </a:extLst>
+          </p:cNvPr>
+          <p:cNvPicPr>
+            <a:picLocks noChangeAspect="1"/>
+          </p:cNvPicPr>
+          <p:nvPr/>
+        </p:nvPicPr>
+        <p:blipFill rotWithShape="1">
+          <a:blip r:embed="rId2"/>
+          <a:srcRect r="16956" b="75530"/>
+          <a:stretch/>
+        </p:blipFill>
+        <p:spPr>
+          <a:xfrm>
+            <a:off x="40723" y="1054781"/>
+            <a:ext cx="6055277" cy="628169"/>
+          </a:xfrm>
+          <a:prstGeom prst="rect">
+            <a:avLst/>
+          </a:prstGeom>
+        </p:spPr>
+      </p:pic>
     </p:spTree>
     <p:extLst>
       <p:ext uri="{BB962C8B-B14F-4D97-AF65-F5344CB8AC3E}">
@@ -4671,10 +4979,10 @@
       </p:sp>
       <p:pic>
         <p:nvPicPr>
-          <p:cNvPr id="5" name="Picture 4">
-            <a:extLst>
-              <a:ext uri="{FF2B5EF4-FFF2-40B4-BE49-F238E27FC236}">
-                <a16:creationId xmlns:a16="http://schemas.microsoft.com/office/drawing/2014/main" id="{4AA45268-2785-45E6-A39F-206F504538E9}"/>
+          <p:cNvPr id="4" name="Picture 3">
+            <a:extLst>
+              <a:ext uri="{FF2B5EF4-FFF2-40B4-BE49-F238E27FC236}">
+                <a16:creationId xmlns:a16="http://schemas.microsoft.com/office/drawing/2014/main" id="{30BAAAB4-2860-4C88-9276-3517DF6E207D}"/>
               </a:ext>
             </a:extLst>
           </p:cNvPr>
@@ -4691,8 +4999,8 @@
         </p:blipFill>
         <p:spPr>
           <a:xfrm>
-            <a:off x="675227" y="1385319"/>
-            <a:ext cx="8324850" cy="5010150"/>
+            <a:off x="602959" y="1331140"/>
+            <a:ext cx="9677400" cy="4933950"/>
           </a:xfrm>
           <a:prstGeom prst="rect">
             <a:avLst/>
@@ -4957,10 +5265,10 @@
       </p:sp>
       <p:pic>
         <p:nvPicPr>
-          <p:cNvPr id="5" name="Picture 4">
-            <a:extLst>
-              <a:ext uri="{FF2B5EF4-FFF2-40B4-BE49-F238E27FC236}">
-                <a16:creationId xmlns:a16="http://schemas.microsoft.com/office/drawing/2014/main" id="{4AA45268-2785-45E6-A39F-206F504538E9}"/>
+          <p:cNvPr id="3" name="Picture 2">
+            <a:extLst>
+              <a:ext uri="{FF2B5EF4-FFF2-40B4-BE49-F238E27FC236}">
+                <a16:creationId xmlns:a16="http://schemas.microsoft.com/office/drawing/2014/main" id="{034174D1-CD64-48FE-9862-C1BEE832917A}"/>
               </a:ext>
             </a:extLst>
           </p:cNvPr>
@@ -4969,20 +5277,21 @@
           </p:cNvPicPr>
           <p:nvPr/>
         </p:nvPicPr>
-        <p:blipFill rotWithShape="1">
+        <p:blipFill>
           <a:blip r:embed="rId2"/>
-          <a:srcRect l="15855" t="26486" r="27976" b="20183"/>
-          <a:stretch/>
+          <a:stretch>
+            <a:fillRect/>
+          </a:stretch>
         </p:blipFill>
         <p:spPr>
           <a:xfrm>
-            <a:off x="7370970" y="13493"/>
-            <a:ext cx="4821030" cy="2754874"/>
+            <a:off x="7290032" y="1"/>
+            <a:ext cx="4901967" cy="2454188"/>
           </a:xfrm>
           <a:prstGeom prst="rect">
             <a:avLst/>
           </a:prstGeom>
-          <a:ln w="38100">
+          <a:ln w="28575">
             <a:solidFill>
               <a:schemeClr val="tx1"/>
             </a:solidFill>
@@ -5172,10 +5481,10 @@
       </p:sp>
       <p:pic>
         <p:nvPicPr>
-          <p:cNvPr id="4" name="Picture 3">
-            <a:extLst>
-              <a:ext uri="{FF2B5EF4-FFF2-40B4-BE49-F238E27FC236}">
-                <a16:creationId xmlns:a16="http://schemas.microsoft.com/office/drawing/2014/main" id="{E23F4A1F-72C7-4ADF-B7C1-B1F374F8A8BB}"/>
+          <p:cNvPr id="6" name="Picture 5">
+            <a:extLst>
+              <a:ext uri="{FF2B5EF4-FFF2-40B4-BE49-F238E27FC236}">
+                <a16:creationId xmlns:a16="http://schemas.microsoft.com/office/drawing/2014/main" id="{9556F4E3-B92F-4319-983B-1E6EF6E634A7}"/>
               </a:ext>
             </a:extLst>
           </p:cNvPr>
@@ -5192,8 +5501,8 @@
         </p:blipFill>
         <p:spPr>
           <a:xfrm>
-            <a:off x="0" y="1422850"/>
-            <a:ext cx="6870583" cy="3169148"/>
+            <a:off x="0" y="1431721"/>
+            <a:ext cx="6870583" cy="3177645"/>
           </a:xfrm>
           <a:prstGeom prst="rect">
             <a:avLst/>
@@ -5202,10 +5511,10 @@
       </p:pic>
       <p:pic>
         <p:nvPicPr>
-          <p:cNvPr id="5" name="Picture 4">
-            <a:extLst>
-              <a:ext uri="{FF2B5EF4-FFF2-40B4-BE49-F238E27FC236}">
-                <a16:creationId xmlns:a16="http://schemas.microsoft.com/office/drawing/2014/main" id="{9A434D42-966C-479D-84D7-12AD38ACDE9D}"/>
+          <p:cNvPr id="7" name="Picture 6">
+            <a:extLst>
+              <a:ext uri="{FF2B5EF4-FFF2-40B4-BE49-F238E27FC236}">
+                <a16:creationId xmlns:a16="http://schemas.microsoft.com/office/drawing/2014/main" id="{519158DF-FB22-4A70-833B-94A4B3FBBAA6}"/>
               </a:ext>
             </a:extLst>
           </p:cNvPr>
@@ -5222,8 +5531,8 @@
         </p:blipFill>
         <p:spPr>
           <a:xfrm>
-            <a:off x="6870583" y="3726690"/>
-            <a:ext cx="5321417" cy="3131310"/>
+            <a:off x="6870583" y="4078025"/>
+            <a:ext cx="5278931" cy="2696507"/>
           </a:xfrm>
           <a:prstGeom prst="rect">
             <a:avLst/>
@@ -5906,64 +6215,6 @@
       </p:sp>
       <p:pic>
         <p:nvPicPr>
-          <p:cNvPr id="4" name="Picture 3">
-            <a:extLst>
-              <a:ext uri="{FF2B5EF4-FFF2-40B4-BE49-F238E27FC236}">
-                <a16:creationId xmlns:a16="http://schemas.microsoft.com/office/drawing/2014/main" id="{E23F4A1F-72C7-4ADF-B7C1-B1F374F8A8BB}"/>
-              </a:ext>
-            </a:extLst>
-          </p:cNvPr>
-          <p:cNvPicPr>
-            <a:picLocks noChangeAspect="1"/>
-          </p:cNvPicPr>
-          <p:nvPr/>
-        </p:nvPicPr>
-        <p:blipFill rotWithShape="1">
-          <a:blip r:embed="rId2"/>
-          <a:srcRect l="76266" t="18418" b="42524"/>
-          <a:stretch/>
-        </p:blipFill>
-        <p:spPr>
-          <a:xfrm>
-            <a:off x="4528355" y="1655603"/>
-            <a:ext cx="2541865" cy="1929469"/>
-          </a:xfrm>
-          <a:prstGeom prst="rect">
-            <a:avLst/>
-          </a:prstGeom>
-        </p:spPr>
-      </p:pic>
-      <p:pic>
-        <p:nvPicPr>
-          <p:cNvPr id="5" name="Picture 4">
-            <a:extLst>
-              <a:ext uri="{FF2B5EF4-FFF2-40B4-BE49-F238E27FC236}">
-                <a16:creationId xmlns:a16="http://schemas.microsoft.com/office/drawing/2014/main" id="{DDF427E8-3ECF-477B-83AE-D4E4F5BDCAE4}"/>
-              </a:ext>
-            </a:extLst>
-          </p:cNvPr>
-          <p:cNvPicPr>
-            <a:picLocks noChangeAspect="1"/>
-          </p:cNvPicPr>
-          <p:nvPr/>
-        </p:nvPicPr>
-        <p:blipFill rotWithShape="1">
-          <a:blip r:embed="rId2"/>
-          <a:srcRect l="51279" t="18418" r="24987" b="42524"/>
-          <a:stretch/>
-        </p:blipFill>
-        <p:spPr>
-          <a:xfrm>
-            <a:off x="903399" y="1635848"/>
-            <a:ext cx="2541864" cy="1929469"/>
-          </a:xfrm>
-          <a:prstGeom prst="rect">
-            <a:avLst/>
-          </a:prstGeom>
-        </p:spPr>
-      </p:pic>
-      <p:pic>
-        <p:nvPicPr>
           <p:cNvPr id="6" name="Picture 5">
             <a:extLst>
               <a:ext uri="{FF2B5EF4-FFF2-40B4-BE49-F238E27FC236}">
@@ -6122,6 +6373,66 @@
           </a:p>
         </p:txBody>
       </p:sp>
+      <p:pic>
+        <p:nvPicPr>
+          <p:cNvPr id="3" name="Picture 2">
+            <a:extLst>
+              <a:ext uri="{FF2B5EF4-FFF2-40B4-BE49-F238E27FC236}">
+                <a16:creationId xmlns:a16="http://schemas.microsoft.com/office/drawing/2014/main" id="{021C0C0A-6DCB-4D5A-9C78-F39CA300DA1E}"/>
+              </a:ext>
+            </a:extLst>
+          </p:cNvPr>
+          <p:cNvPicPr>
+            <a:picLocks noChangeAspect="1"/>
+          </p:cNvPicPr>
+          <p:nvPr/>
+        </p:nvPicPr>
+        <p:blipFill>
+          <a:blip r:embed="rId3"/>
+          <a:stretch>
+            <a:fillRect/>
+          </a:stretch>
+        </p:blipFill>
+        <p:spPr>
+          <a:xfrm>
+            <a:off x="1314725" y="1635849"/>
+            <a:ext cx="2595080" cy="1984086"/>
+          </a:xfrm>
+          <a:prstGeom prst="rect">
+            <a:avLst/>
+          </a:prstGeom>
+        </p:spPr>
+      </p:pic>
+      <p:pic>
+        <p:nvPicPr>
+          <p:cNvPr id="10" name="Picture 9">
+            <a:extLst>
+              <a:ext uri="{FF2B5EF4-FFF2-40B4-BE49-F238E27FC236}">
+                <a16:creationId xmlns:a16="http://schemas.microsoft.com/office/drawing/2014/main" id="{AB707DF6-A4ED-4831-B30F-68AA2EE2A5D2}"/>
+              </a:ext>
+            </a:extLst>
+          </p:cNvPr>
+          <p:cNvPicPr>
+            <a:picLocks noChangeAspect="1"/>
+          </p:cNvPicPr>
+          <p:nvPr/>
+        </p:nvPicPr>
+        <p:blipFill>
+          <a:blip r:embed="rId4"/>
+          <a:stretch>
+            <a:fillRect/>
+          </a:stretch>
+        </p:blipFill>
+        <p:spPr>
+          <a:xfrm>
+            <a:off x="4798460" y="1635849"/>
+            <a:ext cx="2595080" cy="1986030"/>
+          </a:xfrm>
+          <a:prstGeom prst="rect">
+            <a:avLst/>
+          </a:prstGeom>
+        </p:spPr>
+      </p:pic>
     </p:spTree>
     <p:extLst>
       <p:ext uri="{BB962C8B-B14F-4D97-AF65-F5344CB8AC3E}">
@@ -6188,36 +6499,6 @@
           </a:p>
         </p:txBody>
       </p:sp>
-      <p:pic>
-        <p:nvPicPr>
-          <p:cNvPr id="3" name="Picture 2">
-            <a:extLst>
-              <a:ext uri="{FF2B5EF4-FFF2-40B4-BE49-F238E27FC236}">
-                <a16:creationId xmlns:a16="http://schemas.microsoft.com/office/drawing/2014/main" id="{E8A2492A-95D1-4B74-A4CC-FE5F0BA46E04}"/>
-              </a:ext>
-            </a:extLst>
-          </p:cNvPr>
-          <p:cNvPicPr>
-            <a:picLocks noChangeAspect="1"/>
-          </p:cNvPicPr>
-          <p:nvPr/>
-        </p:nvPicPr>
-        <p:blipFill>
-          <a:blip r:embed="rId2"/>
-          <a:stretch>
-            <a:fillRect/>
-          </a:stretch>
-        </p:blipFill>
-        <p:spPr>
-          <a:xfrm>
-            <a:off x="191057" y="1690688"/>
-            <a:ext cx="2647950" cy="2886075"/>
-          </a:xfrm>
-          <a:prstGeom prst="rect">
-            <a:avLst/>
-          </a:prstGeom>
-        </p:spPr>
-      </p:pic>
       <p:sp>
         <p:nvSpPr>
           <p:cNvPr id="11" name="TextBox 10">
@@ -6636,6 +6917,36 @@
           </a:p>
         </p:txBody>
       </p:sp>
+      <p:pic>
+        <p:nvPicPr>
+          <p:cNvPr id="4" name="Picture 3">
+            <a:extLst>
+              <a:ext uri="{FF2B5EF4-FFF2-40B4-BE49-F238E27FC236}">
+                <a16:creationId xmlns:a16="http://schemas.microsoft.com/office/drawing/2014/main" id="{08BB0FE9-954B-45F4-B291-AAACB8131A3C}"/>
+              </a:ext>
+            </a:extLst>
+          </p:cNvPr>
+          <p:cNvPicPr>
+            <a:picLocks noChangeAspect="1"/>
+          </p:cNvPicPr>
+          <p:nvPr/>
+        </p:nvPicPr>
+        <p:blipFill>
+          <a:blip r:embed="rId2"/>
+          <a:stretch>
+            <a:fillRect/>
+          </a:stretch>
+        </p:blipFill>
+        <p:spPr>
+          <a:xfrm>
+            <a:off x="78297" y="2379980"/>
+            <a:ext cx="2755002" cy="2098040"/>
+          </a:xfrm>
+          <a:prstGeom prst="rect">
+            <a:avLst/>
+          </a:prstGeom>
+        </p:spPr>
+      </p:pic>
     </p:spTree>
     <p:extLst>
       <p:ext uri="{BB962C8B-B14F-4D97-AF65-F5344CB8AC3E}">
@@ -7197,10 +7508,10 @@
       </p:sp>
       <p:pic>
         <p:nvPicPr>
-          <p:cNvPr id="5" name="Picture 4">
-            <a:extLst>
-              <a:ext uri="{FF2B5EF4-FFF2-40B4-BE49-F238E27FC236}">
-                <a16:creationId xmlns:a16="http://schemas.microsoft.com/office/drawing/2014/main" id="{0BE2251C-899B-4125-BA01-392020058228}"/>
+          <p:cNvPr id="4" name="Picture 3">
+            <a:extLst>
+              <a:ext uri="{FF2B5EF4-FFF2-40B4-BE49-F238E27FC236}">
+                <a16:creationId xmlns:a16="http://schemas.microsoft.com/office/drawing/2014/main" id="{CBD718E5-61F9-402C-B616-F64496F20B82}"/>
               </a:ext>
             </a:extLst>
           </p:cNvPr>
@@ -7209,15 +7520,16 @@
           </p:cNvPicPr>
           <p:nvPr/>
         </p:nvPicPr>
-        <p:blipFill rotWithShape="1">
+        <p:blipFill>
           <a:blip r:embed="rId2"/>
-          <a:srcRect t="-325"/>
-          <a:stretch/>
+          <a:stretch>
+            <a:fillRect/>
+          </a:stretch>
         </p:blipFill>
         <p:spPr>
           <a:xfrm>
-            <a:off x="900418" y="1459684"/>
-            <a:ext cx="10391164" cy="2470939"/>
+            <a:off x="900418" y="1364119"/>
+            <a:ext cx="7291605" cy="2541711"/>
           </a:xfrm>
           <a:prstGeom prst="rect">
             <a:avLst/>
@@ -7226,10 +7538,10 @@
       </p:pic>
       <p:pic>
         <p:nvPicPr>
-          <p:cNvPr id="6" name="Picture 5">
-            <a:extLst>
-              <a:ext uri="{FF2B5EF4-FFF2-40B4-BE49-F238E27FC236}">
-                <a16:creationId xmlns:a16="http://schemas.microsoft.com/office/drawing/2014/main" id="{49B34222-9073-4EFC-93E1-490D8AE958A1}"/>
+          <p:cNvPr id="8" name="Picture 7">
+            <a:extLst>
+              <a:ext uri="{FF2B5EF4-FFF2-40B4-BE49-F238E27FC236}">
+                <a16:creationId xmlns:a16="http://schemas.microsoft.com/office/drawing/2014/main" id="{5F4746B6-BAFA-437B-BFFE-199CFB4CE1FB}"/>
               </a:ext>
             </a:extLst>
           </p:cNvPr>
@@ -7238,15 +7550,16 @@
           </p:cNvPicPr>
           <p:nvPr/>
         </p:nvPicPr>
-        <p:blipFill rotWithShape="1">
+        <p:blipFill>
           <a:blip r:embed="rId3"/>
-          <a:srcRect t="61"/>
-          <a:stretch/>
+          <a:stretch>
+            <a:fillRect/>
+          </a:stretch>
         </p:blipFill>
         <p:spPr>
           <a:xfrm>
-            <a:off x="900418" y="4018328"/>
-            <a:ext cx="10391164" cy="2581210"/>
+            <a:off x="900418" y="4044499"/>
+            <a:ext cx="7291605" cy="2567060"/>
           </a:xfrm>
           <a:prstGeom prst="rect">
             <a:avLst/>
@@ -7568,15 +7881,6 @@
 </file>
 
 <file path=customXml/item2.xml><?xml version="1.0" encoding="utf-8"?>
-<?mso-contentType ?>
-<FormTemplates xmlns="http://schemas.microsoft.com/sharepoint/v3/contenttype/forms">
-  <Display>DocumentLibraryForm</Display>
-  <Edit>DocumentLibraryForm</Edit>
-  <New>DocumentLibraryForm</New>
-</FormTemplates>
-</file>
-
-<file path=customXml/item3.xml><?xml version="1.0" encoding="utf-8"?>
 <ct:contentTypeSchema xmlns:ct="http://schemas.microsoft.com/office/2006/metadata/contentType" xmlns:ma="http://schemas.microsoft.com/office/2006/metadata/properties/metaAttributes" ct:_="" ma:_="" ma:contentTypeName="Document" ma:contentTypeID="0x010100560B5B77A830FC46B2AE00BAF7D52A54" ma:contentTypeVersion="8" ma:contentTypeDescription="Create a new document." ma:contentTypeScope="" ma:versionID="c49ab60c24c5404d00352c7897dfe60e">
   <xsd:schema xmlns:xsd="http://www.w3.org/2001/XMLSchema" xmlns:xs="http://www.w3.org/2001/XMLSchema" xmlns:p="http://schemas.microsoft.com/office/2006/metadata/properties" xmlns:ns3="8c07c512-1ff3-44bd-87df-82ef976e112f" targetNamespace="http://schemas.microsoft.com/office/2006/metadata/properties" ma:root="true" ma:fieldsID="55738ef3edeacc6a5b0aa7ce2a2926d8" ns3:_="">
     <xsd:import namespace="8c07c512-1ff3-44bd-87df-82ef976e112f"/>
@@ -7746,31 +8050,32 @@
 </ct:contentTypeSchema>
 </file>
 
+<file path=customXml/item3.xml><?xml version="1.0" encoding="utf-8"?>
+<?mso-contentType ?>
+<FormTemplates xmlns="http://schemas.microsoft.com/sharepoint/v3/contenttype/forms">
+  <Display>DocumentLibraryForm</Display>
+  <Edit>DocumentLibraryForm</Edit>
+  <New>DocumentLibraryForm</New>
+</FormTemplates>
+</file>
+
 <file path=customXml/itemProps1.xml><?xml version="1.0" encoding="utf-8"?>
 <ds:datastoreItem xmlns:ds="http://schemas.openxmlformats.org/officeDocument/2006/customXml" ds:itemID="{DB871C48-42D6-46C3-9B5F-6F3B89F20340}">
   <ds:schemaRefs>
     <ds:schemaRef ds:uri="8c07c512-1ff3-44bd-87df-82ef976e112f"/>
     <ds:schemaRef ds:uri="http://purl.org/dc/terms/"/>
-    <ds:schemaRef ds:uri="http://schemas.openxmlformats.org/package/2006/metadata/core-properties"/>
     <ds:schemaRef ds:uri="http://schemas.microsoft.com/office/2006/documentManagement/types"/>
+    <ds:schemaRef ds:uri="http://purl.org/dc/dcmitype/"/>
     <ds:schemaRef ds:uri="http://schemas.microsoft.com/office/infopath/2007/PartnerControls"/>
     <ds:schemaRef ds:uri="http://purl.org/dc/elements/1.1/"/>
     <ds:schemaRef ds:uri="http://schemas.microsoft.com/office/2006/metadata/properties"/>
+    <ds:schemaRef ds:uri="http://schemas.openxmlformats.org/package/2006/metadata/core-properties"/>
     <ds:schemaRef ds:uri="http://www.w3.org/XML/1998/namespace"/>
-    <ds:schemaRef ds:uri="http://purl.org/dc/dcmitype/"/>
   </ds:schemaRefs>
 </ds:datastoreItem>
 </file>
 
 <file path=customXml/itemProps2.xml><?xml version="1.0" encoding="utf-8"?>
-<ds:datastoreItem xmlns:ds="http://schemas.openxmlformats.org/officeDocument/2006/customXml" ds:itemID="{6671402B-9172-4E85-AD40-2DB2425472AA}">
-  <ds:schemaRefs>
-    <ds:schemaRef ds:uri="http://schemas.microsoft.com/sharepoint/v3/contenttype/forms"/>
-  </ds:schemaRefs>
-</ds:datastoreItem>
-</file>
-
-<file path=customXml/itemProps3.xml><?xml version="1.0" encoding="utf-8"?>
 <ds:datastoreItem xmlns:ds="http://schemas.openxmlformats.org/officeDocument/2006/customXml" ds:itemID="{89743806-55A8-4985-A79A-2A8AEF237189}">
   <ds:schemaRefs>
     <ds:schemaRef ds:uri="http://schemas.microsoft.com/office/2006/metadata/contentType"/>
@@ -7786,4 +8091,12 @@
     <ds:schemaRef ds:uri="http://schemas.microsoft.com/internal/obd"/>
   </ds:schemaRefs>
 </ds:datastoreItem>
+</file>
+
+<file path=customXml/itemProps3.xml><?xml version="1.0" encoding="utf-8"?>
+<ds:datastoreItem xmlns:ds="http://schemas.openxmlformats.org/officeDocument/2006/customXml" ds:itemID="{6671402B-9172-4E85-AD40-2DB2425472AA}">
+  <ds:schemaRefs>
+    <ds:schemaRef ds:uri="http://schemas.microsoft.com/sharepoint/v3/contenttype/forms"/>
+  </ds:schemaRefs>
+</ds:datastoreItem>
 </file>
</xml_diff>